<commit_message>
1. finish COMP712 induction slides 2. add more controls to images width, height, round corner, zoom, etc. 3. change the aspect ratio of the initial slides (wide screen)
</commit_message>
<xml_diff>
--- a/Uni/Falmouth/draws.pptx
+++ b/Uni/Falmouth/draws.pptx
@@ -7,6 +7,7 @@
   </p:sldMasterIdLst>
   <p:sldIdLst>
     <p:sldId id="351" r:id="rId3"/>
+    <p:sldId id="352" r:id="rId4"/>
   </p:sldIdLst>
   <p:sldSz cx="12192000" cy="6858000"/>
   <p:notesSz cx="6858000" cy="9144000"/>
@@ -105,6 +106,11 @@
       </a:defRPr>
     </a:lvl9pPr>
   </p:defaultTextStyle>
+  <p:extLst>
+    <p:ext uri="{EFAFB233-063F-42B5-8137-9DF3F51BA10A}">
+      <p15:sldGuideLst xmlns:p15="http://schemas.microsoft.com/office/powerpoint/2012/main"/>
+    </p:ext>
+  </p:extLst>
 </p:presentation>
 </file>
 
@@ -257,7 +263,7 @@
           <a:p>
             <a:fld id="{48E59F85-9FF4-44D7-97D6-C195DCA7605D}" type="datetimeFigureOut">
               <a:rPr lang="en-GB" smtClean="0"/>
-              <a:t>06/10/2023</a:t>
+              <a:t>13/10/2023</a:t>
             </a:fld>
             <a:endParaRPr lang="en-GB"/>
           </a:p>
@@ -457,7 +463,7 @@
           <a:p>
             <a:fld id="{48E59F85-9FF4-44D7-97D6-C195DCA7605D}" type="datetimeFigureOut">
               <a:rPr lang="en-GB" smtClean="0"/>
-              <a:t>06/10/2023</a:t>
+              <a:t>13/10/2023</a:t>
             </a:fld>
             <a:endParaRPr lang="en-GB"/>
           </a:p>
@@ -667,7 +673,7 @@
           <a:p>
             <a:fld id="{48E59F85-9FF4-44D7-97D6-C195DCA7605D}" type="datetimeFigureOut">
               <a:rPr lang="en-GB" smtClean="0"/>
-              <a:t>06/10/2023</a:t>
+              <a:t>13/10/2023</a:t>
             </a:fld>
             <a:endParaRPr lang="en-GB"/>
           </a:p>
@@ -2725,7 +2731,7 @@
           <a:p>
             <a:fld id="{48E59F85-9FF4-44D7-97D6-C195DCA7605D}" type="datetimeFigureOut">
               <a:rPr lang="en-GB" smtClean="0"/>
-              <a:t>06/10/2023</a:t>
+              <a:t>13/10/2023</a:t>
             </a:fld>
             <a:endParaRPr lang="en-GB"/>
           </a:p>
@@ -3604,7 +3610,7 @@
           <a:p>
             <a:fld id="{48E59F85-9FF4-44D7-97D6-C195DCA7605D}" type="datetimeFigureOut">
               <a:rPr lang="en-GB" smtClean="0"/>
-              <a:t>06/10/2023</a:t>
+              <a:t>13/10/2023</a:t>
             </a:fld>
             <a:endParaRPr lang="en-GB"/>
           </a:p>
@@ -3872,7 +3878,7 @@
           <a:p>
             <a:fld id="{48E59F85-9FF4-44D7-97D6-C195DCA7605D}" type="datetimeFigureOut">
               <a:rPr lang="en-GB" smtClean="0"/>
-              <a:t>06/10/2023</a:t>
+              <a:t>13/10/2023</a:t>
             </a:fld>
             <a:endParaRPr lang="en-GB"/>
           </a:p>
@@ -4287,7 +4293,7 @@
           <a:p>
             <a:fld id="{48E59F85-9FF4-44D7-97D6-C195DCA7605D}" type="datetimeFigureOut">
               <a:rPr lang="en-GB" smtClean="0"/>
-              <a:t>06/10/2023</a:t>
+              <a:t>13/10/2023</a:t>
             </a:fld>
             <a:endParaRPr lang="en-GB"/>
           </a:p>
@@ -4429,7 +4435,7 @@
           <a:p>
             <a:fld id="{48E59F85-9FF4-44D7-97D6-C195DCA7605D}" type="datetimeFigureOut">
               <a:rPr lang="en-GB" smtClean="0"/>
-              <a:t>06/10/2023</a:t>
+              <a:t>13/10/2023</a:t>
             </a:fld>
             <a:endParaRPr lang="en-GB"/>
           </a:p>
@@ -4542,7 +4548,7 @@
           <a:p>
             <a:fld id="{48E59F85-9FF4-44D7-97D6-C195DCA7605D}" type="datetimeFigureOut">
               <a:rPr lang="en-GB" smtClean="0"/>
-              <a:t>06/10/2023</a:t>
+              <a:t>13/10/2023</a:t>
             </a:fld>
             <a:endParaRPr lang="en-GB"/>
           </a:p>
@@ -4855,7 +4861,7 @@
           <a:p>
             <a:fld id="{48E59F85-9FF4-44D7-97D6-C195DCA7605D}" type="datetimeFigureOut">
               <a:rPr lang="en-GB" smtClean="0"/>
-              <a:t>06/10/2023</a:t>
+              <a:t>13/10/2023</a:t>
             </a:fld>
             <a:endParaRPr lang="en-GB"/>
           </a:p>
@@ -5144,7 +5150,7 @@
           <a:p>
             <a:fld id="{48E59F85-9FF4-44D7-97D6-C195DCA7605D}" type="datetimeFigureOut">
               <a:rPr lang="en-GB" smtClean="0"/>
-              <a:t>06/10/2023</a:t>
+              <a:t>13/10/2023</a:t>
             </a:fld>
             <a:endParaRPr lang="en-GB"/>
           </a:p>
@@ -5387,7 +5393,7 @@
           <a:p>
             <a:fld id="{48E59F85-9FF4-44D7-97D6-C195DCA7605D}" type="datetimeFigureOut">
               <a:rPr lang="en-GB" smtClean="0"/>
-              <a:t>06/10/2023</a:t>
+              <a:t>13/10/2023</a:t>
             </a:fld>
             <a:endParaRPr lang="en-GB"/>
           </a:p>
@@ -6331,7 +6337,7 @@
             <p:ph idx="1"/>
             <p:extLst>
               <p:ext uri="{D42A27DB-BD31-4B8C-83A1-F6EECF244321}">
-                <p14:modId xmlns:p14="http://schemas.microsoft.com/office/powerpoint/2010/main" val="3633309546"/>
+                <p14:modId xmlns:p14="http://schemas.microsoft.com/office/powerpoint/2010/main" val="930885863"/>
               </p:ext>
             </p:extLst>
           </p:nvPr>
@@ -7045,7 +7051,7 @@
                     <a:bodyPr/>
                     <a:lstStyle/>
                     <a:p>
-                      <a:endParaRPr lang="en-GB"/>
+                      <a:endParaRPr lang="en-GB" dirty="0"/>
                     </a:p>
                   </a:txBody>
                   <a:tcPr/>
@@ -8081,183 +8087,60 @@
           </p:txBody>
         </p:sp>
       </p:grpSp>
-      <p:grpSp>
-        <p:nvGrpSpPr>
-          <p:cNvPr id="27" name="Group 26">
+      <p:sp>
+        <p:nvSpPr>
+          <p:cNvPr id="28" name="Rectangle: Rounded Corners 27">
             <a:extLst>
               <a:ext uri="{FF2B5EF4-FFF2-40B4-BE49-F238E27FC236}">
-                <a16:creationId xmlns:a16="http://schemas.microsoft.com/office/drawing/2014/main" id="{645BBC8E-4409-C87A-5AF6-0C27F150F24D}"/>
+                <a16:creationId xmlns:a16="http://schemas.microsoft.com/office/drawing/2014/main" id="{E1D9B173-5C27-FD02-C502-86F25A77F3C9}"/>
               </a:ext>
             </a:extLst>
           </p:cNvPr>
-          <p:cNvGrpSpPr/>
+          <p:cNvSpPr/>
           <p:nvPr/>
-        </p:nvGrpSpPr>
-        <p:grpSpPr>
+        </p:nvSpPr>
+        <p:spPr>
           <a:xfrm>
-            <a:off x="3352800" y="4092575"/>
-            <a:ext cx="1371600" cy="622300"/>
-            <a:chOff x="1828800" y="2241550"/>
-            <a:chExt cx="1371600" cy="622300"/>
+            <a:off x="3352800" y="4314825"/>
+            <a:ext cx="1371600" cy="196850"/>
           </a:xfrm>
-        </p:grpSpPr>
-        <p:sp>
-          <p:nvSpPr>
-            <p:cNvPr id="28" name="Rectangle: Rounded Corners 27">
-              <a:extLst>
-                <a:ext uri="{FF2B5EF4-FFF2-40B4-BE49-F238E27FC236}">
-                  <a16:creationId xmlns:a16="http://schemas.microsoft.com/office/drawing/2014/main" id="{E1D9B173-5C27-FD02-C502-86F25A77F3C9}"/>
-                </a:ext>
-              </a:extLst>
-            </p:cNvPr>
-            <p:cNvSpPr/>
-            <p:nvPr/>
-          </p:nvSpPr>
-          <p:spPr>
-            <a:xfrm>
-              <a:off x="1828800" y="2241550"/>
-              <a:ext cx="1371600" cy="196850"/>
-            </a:xfrm>
-            <a:prstGeom prst="roundRect">
-              <a:avLst/>
-            </a:prstGeom>
-          </p:spPr>
-          <p:style>
-            <a:lnRef idx="1">
-              <a:schemeClr val="accent3"/>
-            </a:lnRef>
-            <a:fillRef idx="2">
-              <a:schemeClr val="accent3"/>
-            </a:fillRef>
-            <a:effectRef idx="1">
-              <a:schemeClr val="accent3"/>
-            </a:effectRef>
-            <a:fontRef idx="minor">
-              <a:schemeClr val="dk1"/>
-            </a:fontRef>
-          </p:style>
-          <p:txBody>
-            <a:bodyPr rtlCol="0" anchor="ctr"/>
-            <a:lstStyle/>
-            <a:p>
-              <a:pPr algn="ctr" defTabSz="457200"/>
-              <a:r>
-                <a:rPr lang="en-GB" sz="1200" dirty="0">
-                  <a:solidFill>
-                    <a:prstClr val="black"/>
-                  </a:solidFill>
-                  <a:latin typeface="Calibri"/>
-                </a:rPr>
-                <a:t>Lecture (1 hr)</a:t>
-              </a:r>
-            </a:p>
-          </p:txBody>
-        </p:sp>
-        <p:sp>
-          <p:nvSpPr>
-            <p:cNvPr id="29" name="Rectangle: Rounded Corners 28">
-              <a:extLst>
-                <a:ext uri="{FF2B5EF4-FFF2-40B4-BE49-F238E27FC236}">
-                  <a16:creationId xmlns:a16="http://schemas.microsoft.com/office/drawing/2014/main" id="{5793F034-4747-0080-0673-07E93B6A4017}"/>
-                </a:ext>
-              </a:extLst>
-            </p:cNvPr>
-            <p:cNvSpPr/>
-            <p:nvPr/>
-          </p:nvSpPr>
-          <p:spPr>
-            <a:xfrm>
-              <a:off x="1828800" y="2457450"/>
-              <a:ext cx="1371600" cy="196850"/>
-            </a:xfrm>
-            <a:prstGeom prst="roundRect">
-              <a:avLst/>
-            </a:prstGeom>
-          </p:spPr>
-          <p:style>
-            <a:lnRef idx="1">
-              <a:schemeClr val="accent5"/>
-            </a:lnRef>
-            <a:fillRef idx="2">
-              <a:schemeClr val="accent5"/>
-            </a:fillRef>
-            <a:effectRef idx="1">
-              <a:schemeClr val="accent5"/>
-            </a:effectRef>
-            <a:fontRef idx="minor">
-              <a:schemeClr val="dk1"/>
-            </a:fontRef>
-          </p:style>
-          <p:txBody>
-            <a:bodyPr rtlCol="0" anchor="ctr"/>
-            <a:lstStyle/>
-            <a:p>
-              <a:pPr algn="ctr" defTabSz="457200"/>
-              <a:r>
-                <a:rPr lang="en-GB" sz="1200" dirty="0">
-                  <a:solidFill>
-                    <a:prstClr val="black"/>
-                  </a:solidFill>
-                  <a:latin typeface="Calibri"/>
-                </a:rPr>
-                <a:t>Workshop (2 hr)</a:t>
-              </a:r>
-            </a:p>
-          </p:txBody>
-        </p:sp>
-        <p:sp>
-          <p:nvSpPr>
-            <p:cNvPr id="30" name="Rectangle: Rounded Corners 29">
-              <a:extLst>
-                <a:ext uri="{FF2B5EF4-FFF2-40B4-BE49-F238E27FC236}">
-                  <a16:creationId xmlns:a16="http://schemas.microsoft.com/office/drawing/2014/main" id="{EC94D3B1-EEAC-F947-D1A1-83D07F8E72F4}"/>
-                </a:ext>
-              </a:extLst>
-            </p:cNvPr>
-            <p:cNvSpPr/>
-            <p:nvPr/>
-          </p:nvSpPr>
-          <p:spPr>
-            <a:xfrm>
-              <a:off x="1828800" y="2667000"/>
-              <a:ext cx="1371600" cy="196850"/>
-            </a:xfrm>
-            <a:prstGeom prst="roundRect">
-              <a:avLst/>
-            </a:prstGeom>
-          </p:spPr>
-          <p:style>
-            <a:lnRef idx="1">
-              <a:schemeClr val="accent4"/>
-            </a:lnRef>
-            <a:fillRef idx="2">
-              <a:schemeClr val="accent4"/>
-            </a:fillRef>
-            <a:effectRef idx="1">
-              <a:schemeClr val="accent4"/>
-            </a:effectRef>
-            <a:fontRef idx="minor">
-              <a:schemeClr val="dk1"/>
-            </a:fontRef>
-          </p:style>
-          <p:txBody>
-            <a:bodyPr rtlCol="0" anchor="ctr"/>
-            <a:lstStyle/>
-            <a:p>
-              <a:pPr algn="ctr" defTabSz="457200"/>
-              <a:r>
-                <a:rPr lang="en-GB" sz="1200" dirty="0">
-                  <a:solidFill>
-                    <a:prstClr val="black"/>
-                  </a:solidFill>
-                  <a:latin typeface="Calibri"/>
-                </a:rPr>
-                <a:t>Seminar (1 hr)</a:t>
-              </a:r>
-            </a:p>
-          </p:txBody>
-        </p:sp>
-      </p:grpSp>
+          <a:prstGeom prst="roundRect">
+            <a:avLst/>
+          </a:prstGeom>
+        </p:spPr>
+        <p:style>
+          <a:lnRef idx="2">
+            <a:schemeClr val="accent6">
+              <a:shade val="15000"/>
+            </a:schemeClr>
+          </a:lnRef>
+          <a:fillRef idx="1">
+            <a:schemeClr val="accent6"/>
+          </a:fillRef>
+          <a:effectRef idx="0">
+            <a:schemeClr val="accent6"/>
+          </a:effectRef>
+          <a:fontRef idx="minor">
+            <a:schemeClr val="lt1"/>
+          </a:fontRef>
+        </p:style>
+        <p:txBody>
+          <a:bodyPr rtlCol="0" anchor="ctr"/>
+          <a:lstStyle/>
+          <a:p>
+            <a:pPr algn="ctr" defTabSz="457200"/>
+            <a:r>
+              <a:rPr lang="en-GB" sz="1200" dirty="0">
+                <a:solidFill>
+                  <a:prstClr val="black"/>
+                </a:solidFill>
+                <a:latin typeface="Calibri"/>
+              </a:rPr>
+              <a:t>Peer review (1 hr)</a:t>
+            </a:r>
+          </a:p>
+        </p:txBody>
+      </p:sp>
       <p:sp>
         <p:nvSpPr>
           <p:cNvPr id="31" name="Rectangle: Rounded Corners 30">
@@ -8272,7 +8155,7 @@
         </p:nvSpPr>
         <p:spPr>
           <a:xfrm>
-            <a:off x="3352800" y="4727575"/>
+            <a:off x="3352800" y="4101465"/>
             <a:ext cx="1371600" cy="196850"/>
           </a:xfrm>
           <a:prstGeom prst="roundRect">
@@ -8371,10 +8254,369 @@
           </a:p>
         </p:txBody>
       </p:sp>
+      <p:sp>
+        <p:nvSpPr>
+          <p:cNvPr id="3" name="Speech Bubble: Rectangle with Corners Rounded 2">
+            <a:extLst>
+              <a:ext uri="{FF2B5EF4-FFF2-40B4-BE49-F238E27FC236}">
+                <a16:creationId xmlns:a16="http://schemas.microsoft.com/office/drawing/2014/main" id="{B678A079-44F3-DD9C-1C4B-01124ED2C9B3}"/>
+              </a:ext>
+            </a:extLst>
+          </p:cNvPr>
+          <p:cNvSpPr/>
+          <p:nvPr/>
+        </p:nvSpPr>
+        <p:spPr>
+          <a:xfrm rot="21137943" flipH="1">
+            <a:off x="6235851" y="3677576"/>
+            <a:ext cx="2822184" cy="626123"/>
+          </a:xfrm>
+          <a:prstGeom prst="wedgeRoundRectCallout">
+            <a:avLst>
+              <a:gd name="adj1" fmla="val -60495"/>
+              <a:gd name="adj2" fmla="val 148735"/>
+              <a:gd name="adj3" fmla="val 16667"/>
+            </a:avLst>
+          </a:prstGeom>
+        </p:spPr>
+        <p:style>
+          <a:lnRef idx="1">
+            <a:schemeClr val="accent1"/>
+          </a:lnRef>
+          <a:fillRef idx="2">
+            <a:schemeClr val="accent1"/>
+          </a:fillRef>
+          <a:effectRef idx="1">
+            <a:schemeClr val="accent1"/>
+          </a:effectRef>
+          <a:fontRef idx="minor">
+            <a:schemeClr val="dk1"/>
+          </a:fontRef>
+        </p:style>
+        <p:txBody>
+          <a:bodyPr rtlCol="0" anchor="ctr"/>
+          <a:lstStyle/>
+          <a:p>
+            <a:pPr algn="ctr"/>
+            <a:r>
+              <a:rPr lang="en-GB" b="1" dirty="0">
+                <a:ln w="9525">
+                  <a:noFill/>
+                  <a:prstDash val="solid"/>
+                </a:ln>
+                <a:solidFill>
+                  <a:schemeClr val="tx1"/>
+                </a:solidFill>
+                <a:effectLst>
+                  <a:outerShdw blurRad="50800" dist="38100" dir="13500000" algn="br" rotWithShape="0">
+                    <a:prstClr val="black">
+                      <a:alpha val="40000"/>
+                    </a:prstClr>
+                  </a:outerShdw>
+                </a:effectLst>
+              </a:rPr>
+              <a:t>Check MyTimetable frequently!</a:t>
+            </a:r>
+          </a:p>
+        </p:txBody>
+      </p:sp>
+      <p:pic>
+        <p:nvPicPr>
+          <p:cNvPr id="36" name="Graphic 35" descr="Man with wavy hair">
+            <a:extLst>
+              <a:ext uri="{FF2B5EF4-FFF2-40B4-BE49-F238E27FC236}">
+                <a16:creationId xmlns:a16="http://schemas.microsoft.com/office/drawing/2014/main" id="{2112FD72-D91D-F7CD-9A73-6077ADD34B81}"/>
+              </a:ext>
+            </a:extLst>
+          </p:cNvPr>
+          <p:cNvPicPr>
+            <a:picLocks noChangeAspect="1"/>
+          </p:cNvPicPr>
+          <p:nvPr/>
+        </p:nvPicPr>
+        <p:blipFill>
+          <a:blip r:embed="rId2">
+            <a:extLst>
+              <a:ext uri="{28A0092B-C50C-407E-A947-70E740481C1C}">
+                <a14:useLocalDpi xmlns:a14="http://schemas.microsoft.com/office/drawing/2010/main" val="0"/>
+              </a:ext>
+              <a:ext uri="{96DAC541-7B7A-43D3-8B79-37D633B846F1}">
+                <asvg:svgBlip xmlns:asvg="http://schemas.microsoft.com/office/drawing/2016/SVG/main" r:embed="rId3"/>
+              </a:ext>
+            </a:extLst>
+          </a:blip>
+          <a:stretch>
+            <a:fillRect/>
+          </a:stretch>
+        </p:blipFill>
+        <p:spPr>
+          <a:xfrm flipH="1">
+            <a:off x="9486900" y="4101465"/>
+            <a:ext cx="723900" cy="882332"/>
+          </a:xfrm>
+          <a:prstGeom prst="rect">
+            <a:avLst/>
+          </a:prstGeom>
+        </p:spPr>
+      </p:pic>
+      <p:pic>
+        <p:nvPicPr>
+          <p:cNvPr id="49" name="Picture 48">
+            <a:extLst>
+              <a:ext uri="{FF2B5EF4-FFF2-40B4-BE49-F238E27FC236}">
+                <a16:creationId xmlns:a16="http://schemas.microsoft.com/office/drawing/2014/main" id="{7C750C31-B2AC-0B91-BA22-5D565DD02927}"/>
+              </a:ext>
+            </a:extLst>
+          </p:cNvPr>
+          <p:cNvPicPr>
+            <a:picLocks noChangeAspect="1"/>
+          </p:cNvPicPr>
+          <p:nvPr/>
+        </p:nvPicPr>
+        <p:blipFill>
+          <a:blip r:embed="rId4">
+            <a:clrChange>
+              <a:clrFrom>
+                <a:srgbClr val="FFFFFF"/>
+              </a:clrFrom>
+              <a:clrTo>
+                <a:srgbClr val="FFFFFF">
+                  <a:alpha val="0"/>
+                </a:srgbClr>
+              </a:clrTo>
+            </a:clrChange>
+          </a:blip>
+          <a:stretch>
+            <a:fillRect/>
+          </a:stretch>
+        </p:blipFill>
+        <p:spPr>
+          <a:xfrm rot="305919">
+            <a:off x="9583187" y="4446967"/>
+            <a:ext cx="394974" cy="424597"/>
+          </a:xfrm>
+          <a:prstGeom prst="rect">
+            <a:avLst/>
+          </a:prstGeom>
+        </p:spPr>
+      </p:pic>
     </p:spTree>
     <p:extLst>
       <p:ext uri="{BB962C8B-B14F-4D97-AF65-F5344CB8AC3E}">
         <p14:creationId xmlns:p14="http://schemas.microsoft.com/office/powerpoint/2010/main" val="1325058870"/>
+      </p:ext>
+    </p:extLst>
+  </p:cSld>
+  <p:clrMapOvr>
+    <a:masterClrMapping/>
+  </p:clrMapOvr>
+</p:sld>
+</file>
+
+<file path=ppt/slides/slide2.xml><?xml version="1.0" encoding="utf-8"?>
+<p:sld xmlns:a="http://schemas.openxmlformats.org/drawingml/2006/main" xmlns:r="http://schemas.openxmlformats.org/officeDocument/2006/relationships" xmlns:p="http://schemas.openxmlformats.org/presentationml/2006/main">
+  <p:cSld>
+    <p:spTree>
+      <p:nvGrpSpPr>
+        <p:cNvPr id="1" name=""/>
+        <p:cNvGrpSpPr/>
+        <p:nvPr/>
+      </p:nvGrpSpPr>
+      <p:grpSpPr>
+        <a:xfrm>
+          <a:off x="0" y="0"/>
+          <a:ext cx="0" cy="0"/>
+          <a:chOff x="0" y="0"/>
+          <a:chExt cx="0" cy="0"/>
+        </a:xfrm>
+      </p:grpSpPr>
+      <p:sp>
+        <p:nvSpPr>
+          <p:cNvPr id="4" name="Slide Number Placeholder 3">
+            <a:extLst>
+              <a:ext uri="{FF2B5EF4-FFF2-40B4-BE49-F238E27FC236}">
+                <a16:creationId xmlns:a16="http://schemas.microsoft.com/office/drawing/2014/main" id="{AA5CB19B-C4B6-5388-593C-1A234AB55B39}"/>
+              </a:ext>
+            </a:extLst>
+          </p:cNvPr>
+          <p:cNvSpPr>
+            <a:spLocks noGrp="1"/>
+          </p:cNvSpPr>
+          <p:nvPr>
+            <p:ph type="sldNum" sz="quarter" idx="12"/>
+          </p:nvPr>
+        </p:nvSpPr>
+        <p:spPr/>
+        <p:txBody>
+          <a:bodyPr/>
+          <a:lstStyle/>
+          <a:p>
+            <a:fld id="{84E1B03A-5E40-A445-9D3D-99FC88E9338B}" type="slidenum">
+              <a:rPr lang="en-US" smtClean="0"/>
+              <a:t>2</a:t>
+            </a:fld>
+            <a:endParaRPr lang="en-US"/>
+          </a:p>
+        </p:txBody>
+      </p:sp>
+      <p:pic>
+        <p:nvPicPr>
+          <p:cNvPr id="1026" name="Picture 2" descr="A drawing of a cartoon character&#10;&#10;Description generated with high confidence">
+            <a:extLst>
+              <a:ext uri="{FF2B5EF4-FFF2-40B4-BE49-F238E27FC236}">
+                <a16:creationId xmlns:a16="http://schemas.microsoft.com/office/drawing/2014/main" id="{EA62EAC8-38B3-4BA3-30B9-29AF1E384F09}"/>
+              </a:ext>
+            </a:extLst>
+          </p:cNvPr>
+          <p:cNvPicPr>
+            <a:picLocks noChangeAspect="1" noChangeArrowheads="1"/>
+          </p:cNvPicPr>
+          <p:nvPr/>
+        </p:nvPicPr>
+        <p:blipFill>
+          <a:blip r:embed="rId2">
+            <a:clrChange>
+              <a:clrFrom>
+                <a:srgbClr val="000000">
+                  <a:alpha val="0"/>
+                </a:srgbClr>
+              </a:clrFrom>
+              <a:clrTo>
+                <a:srgbClr val="000000">
+                  <a:alpha val="0"/>
+                </a:srgbClr>
+              </a:clrTo>
+            </a:clrChange>
+            <a:extLst>
+              <a:ext uri="{28A0092B-C50C-407E-A947-70E740481C1C}">
+                <a14:useLocalDpi xmlns:a14="http://schemas.microsoft.com/office/drawing/2010/main" val="0"/>
+              </a:ext>
+            </a:extLst>
+          </a:blip>
+          <a:srcRect/>
+          <a:stretch>
+            <a:fillRect/>
+          </a:stretch>
+        </p:blipFill>
+        <p:spPr bwMode="auto">
+          <a:xfrm>
+            <a:off x="284990" y="199503"/>
+            <a:ext cx="3229497" cy="3229497"/>
+          </a:xfrm>
+          <a:prstGeom prst="rect">
+            <a:avLst/>
+          </a:prstGeom>
+          <a:noFill/>
+          <a:extLst>
+            <a:ext uri="{909E8E84-426E-40DD-AFC4-6F175D3DCCD1}">
+              <a14:hiddenFill xmlns:a14="http://schemas.microsoft.com/office/drawing/2010/main">
+                <a:solidFill>
+                  <a:srgbClr val="FFFFFF"/>
+                </a:solidFill>
+              </a14:hiddenFill>
+            </a:ext>
+          </a:extLst>
+        </p:spPr>
+      </p:pic>
+      <p:pic>
+        <p:nvPicPr>
+          <p:cNvPr id="1028" name="Picture 4" descr="A picture containing electronics&#10;&#10;Description generated with high confidence">
+            <a:extLst>
+              <a:ext uri="{FF2B5EF4-FFF2-40B4-BE49-F238E27FC236}">
+                <a16:creationId xmlns:a16="http://schemas.microsoft.com/office/drawing/2014/main" id="{C35EE285-8EF8-C14F-C112-A918F6855379}"/>
+              </a:ext>
+            </a:extLst>
+          </p:cNvPr>
+          <p:cNvPicPr>
+            <a:picLocks noGrp="1" noChangeAspect="1" noChangeArrowheads="1"/>
+          </p:cNvPicPr>
+          <p:nvPr>
+            <p:ph idx="1"/>
+          </p:nvPr>
+        </p:nvPicPr>
+        <p:blipFill>
+          <a:blip r:embed="rId3">
+            <a:clrChange>
+              <a:clrFrom>
+                <a:srgbClr val="FEFEFE"/>
+              </a:clrFrom>
+              <a:clrTo>
+                <a:srgbClr val="FEFEFE">
+                  <a:alpha val="0"/>
+                </a:srgbClr>
+              </a:clrTo>
+            </a:clrChange>
+            <a:extLst>
+              <a:ext uri="{28A0092B-C50C-407E-A947-70E740481C1C}">
+                <a14:useLocalDpi xmlns:a14="http://schemas.microsoft.com/office/drawing/2010/main" val="0"/>
+              </a:ext>
+            </a:extLst>
+          </a:blip>
+          <a:srcRect/>
+          <a:stretch>
+            <a:fillRect/>
+          </a:stretch>
+        </p:blipFill>
+        <p:spPr bwMode="auto">
+          <a:xfrm>
+            <a:off x="3305243" y="117327"/>
+            <a:ext cx="3393848" cy="3393848"/>
+          </a:xfrm>
+          <a:prstGeom prst="rect">
+            <a:avLst/>
+          </a:prstGeom>
+          <a:noFill/>
+          <a:extLst>
+            <a:ext uri="{909E8E84-426E-40DD-AFC4-6F175D3DCCD1}">
+              <a14:hiddenFill xmlns:a14="http://schemas.microsoft.com/office/drawing/2010/main">
+                <a:solidFill>
+                  <a:srgbClr val="FFFFFF"/>
+                </a:solidFill>
+              </a14:hiddenFill>
+            </a:ext>
+          </a:extLst>
+        </p:spPr>
+      </p:pic>
+      <p:pic>
+        <p:nvPicPr>
+          <p:cNvPr id="6" name="Picture 5" descr="A close-up of a phone&#10;&#10;Description automatically generated">
+            <a:extLst>
+              <a:ext uri="{FF2B5EF4-FFF2-40B4-BE49-F238E27FC236}">
+                <a16:creationId xmlns:a16="http://schemas.microsoft.com/office/drawing/2014/main" id="{F382C23F-BEF8-B552-62F0-E61E59F0A9AB}"/>
+              </a:ext>
+            </a:extLst>
+          </p:cNvPr>
+          <p:cNvPicPr>
+            <a:picLocks noChangeAspect="1"/>
+          </p:cNvPicPr>
+          <p:nvPr/>
+        </p:nvPicPr>
+        <p:blipFill>
+          <a:blip r:embed="rId4">
+            <a:extLst>
+              <a:ext uri="{28A0092B-C50C-407E-A947-70E740481C1C}">
+                <a14:useLocalDpi xmlns:a14="http://schemas.microsoft.com/office/drawing/2010/main" val="0"/>
+              </a:ext>
+            </a:extLst>
+          </a:blip>
+          <a:stretch>
+            <a:fillRect/>
+          </a:stretch>
+        </p:blipFill>
+        <p:spPr>
+          <a:xfrm>
+            <a:off x="5248515" y="3005138"/>
+            <a:ext cx="6858000" cy="3533775"/>
+          </a:xfrm>
+          <a:prstGeom prst="rect">
+            <a:avLst/>
+          </a:prstGeom>
+        </p:spPr>
+      </p:pic>
+    </p:spTree>
+    <p:extLst>
+      <p:ext uri="{BB962C8B-B14F-4D97-AF65-F5344CB8AC3E}">
+        <p14:creationId xmlns:p14="http://schemas.microsoft.com/office/powerpoint/2010/main" val="2266992111"/>
       </p:ext>
     </p:extLst>
   </p:cSld>

</xml_diff>

<commit_message>
synced from working version on 26/10/2023-21:16:12.39
</commit_message>
<xml_diff>
--- a/Uni/Falmouth/draws.pptx
+++ b/Uni/Falmouth/draws.pptx
@@ -263,7 +263,7 @@
           <a:p>
             <a:fld id="{48E59F85-9FF4-44D7-97D6-C195DCA7605D}" type="datetimeFigureOut">
               <a:rPr lang="en-GB" smtClean="0"/>
-              <a:t>13/10/2023</a:t>
+              <a:t>26/10/2023</a:t>
             </a:fld>
             <a:endParaRPr lang="en-GB"/>
           </a:p>
@@ -463,7 +463,7 @@
           <a:p>
             <a:fld id="{48E59F85-9FF4-44D7-97D6-C195DCA7605D}" type="datetimeFigureOut">
               <a:rPr lang="en-GB" smtClean="0"/>
-              <a:t>13/10/2023</a:t>
+              <a:t>26/10/2023</a:t>
             </a:fld>
             <a:endParaRPr lang="en-GB"/>
           </a:p>
@@ -673,7 +673,7 @@
           <a:p>
             <a:fld id="{48E59F85-9FF4-44D7-97D6-C195DCA7605D}" type="datetimeFigureOut">
               <a:rPr lang="en-GB" smtClean="0"/>
-              <a:t>13/10/2023</a:t>
+              <a:t>26/10/2023</a:t>
             </a:fld>
             <a:endParaRPr lang="en-GB"/>
           </a:p>
@@ -2731,7 +2731,7 @@
           <a:p>
             <a:fld id="{48E59F85-9FF4-44D7-97D6-C195DCA7605D}" type="datetimeFigureOut">
               <a:rPr lang="en-GB" smtClean="0"/>
-              <a:t>13/10/2023</a:t>
+              <a:t>26/10/2023</a:t>
             </a:fld>
             <a:endParaRPr lang="en-GB"/>
           </a:p>
@@ -3610,7 +3610,7 @@
           <a:p>
             <a:fld id="{48E59F85-9FF4-44D7-97D6-C195DCA7605D}" type="datetimeFigureOut">
               <a:rPr lang="en-GB" smtClean="0"/>
-              <a:t>13/10/2023</a:t>
+              <a:t>26/10/2023</a:t>
             </a:fld>
             <a:endParaRPr lang="en-GB"/>
           </a:p>
@@ -3878,7 +3878,7 @@
           <a:p>
             <a:fld id="{48E59F85-9FF4-44D7-97D6-C195DCA7605D}" type="datetimeFigureOut">
               <a:rPr lang="en-GB" smtClean="0"/>
-              <a:t>13/10/2023</a:t>
+              <a:t>26/10/2023</a:t>
             </a:fld>
             <a:endParaRPr lang="en-GB"/>
           </a:p>
@@ -4293,7 +4293,7 @@
           <a:p>
             <a:fld id="{48E59F85-9FF4-44D7-97D6-C195DCA7605D}" type="datetimeFigureOut">
               <a:rPr lang="en-GB" smtClean="0"/>
-              <a:t>13/10/2023</a:t>
+              <a:t>26/10/2023</a:t>
             </a:fld>
             <a:endParaRPr lang="en-GB"/>
           </a:p>
@@ -4435,7 +4435,7 @@
           <a:p>
             <a:fld id="{48E59F85-9FF4-44D7-97D6-C195DCA7605D}" type="datetimeFigureOut">
               <a:rPr lang="en-GB" smtClean="0"/>
-              <a:t>13/10/2023</a:t>
+              <a:t>26/10/2023</a:t>
             </a:fld>
             <a:endParaRPr lang="en-GB"/>
           </a:p>
@@ -4548,7 +4548,7 @@
           <a:p>
             <a:fld id="{48E59F85-9FF4-44D7-97D6-C195DCA7605D}" type="datetimeFigureOut">
               <a:rPr lang="en-GB" smtClean="0"/>
-              <a:t>13/10/2023</a:t>
+              <a:t>26/10/2023</a:t>
             </a:fld>
             <a:endParaRPr lang="en-GB"/>
           </a:p>
@@ -4861,7 +4861,7 @@
           <a:p>
             <a:fld id="{48E59F85-9FF4-44D7-97D6-C195DCA7605D}" type="datetimeFigureOut">
               <a:rPr lang="en-GB" smtClean="0"/>
-              <a:t>13/10/2023</a:t>
+              <a:t>26/10/2023</a:t>
             </a:fld>
             <a:endParaRPr lang="en-GB"/>
           </a:p>
@@ -5150,7 +5150,7 @@
           <a:p>
             <a:fld id="{48E59F85-9FF4-44D7-97D6-C195DCA7605D}" type="datetimeFigureOut">
               <a:rPr lang="en-GB" smtClean="0"/>
-              <a:t>13/10/2023</a:t>
+              <a:t>26/10/2023</a:t>
             </a:fld>
             <a:endParaRPr lang="en-GB"/>
           </a:p>
@@ -5393,7 +5393,7 @@
           <a:p>
             <a:fld id="{48E59F85-9FF4-44D7-97D6-C195DCA7605D}" type="datetimeFigureOut">
               <a:rPr lang="en-GB" smtClean="0"/>
-              <a:t>13/10/2023</a:t>
+              <a:t>26/10/2023</a:t>
             </a:fld>
             <a:endParaRPr lang="en-GB"/>
           </a:p>
@@ -7321,7 +7321,7 @@
                   </a:solidFill>
                   <a:latin typeface="Calibri"/>
                 </a:rPr>
-                <a:t>Workshop (2 hr)</a:t>
+                <a:t>Workshop (4 hr)</a:t>
               </a:r>
             </a:p>
           </p:txBody>
@@ -7373,7 +7373,7 @@
                   </a:solidFill>
                   <a:latin typeface="Calibri"/>
                 </a:rPr>
-                <a:t>Seminar (1 hr)</a:t>
+                <a:t>Seminar (2 hr)</a:t>
               </a:r>
             </a:p>
           </p:txBody>
@@ -7498,7 +7498,7 @@
                   </a:solidFill>
                   <a:latin typeface="Calibri"/>
                 </a:rPr>
-                <a:t>Workshop (2 hr)</a:t>
+                <a:t>Workshop (4 hr)</a:t>
               </a:r>
             </a:p>
           </p:txBody>
@@ -7550,7 +7550,7 @@
                   </a:solidFill>
                   <a:latin typeface="Calibri"/>
                 </a:rPr>
-                <a:t>Seminar (1 hr)</a:t>
+                <a:t>Seminar (2 hr)</a:t>
               </a:r>
             </a:p>
           </p:txBody>
@@ -7675,7 +7675,7 @@
                   </a:solidFill>
                   <a:latin typeface="Calibri"/>
                 </a:rPr>
-                <a:t>Workshop (2 hr)</a:t>
+                <a:t>Workshop (4 hr)</a:t>
               </a:r>
             </a:p>
           </p:txBody>
@@ -7727,7 +7727,7 @@
                   </a:solidFill>
                   <a:latin typeface="Calibri"/>
                 </a:rPr>
-                <a:t>Seminar (1 hr)</a:t>
+                <a:t>Seminar (2 hr)</a:t>
               </a:r>
             </a:p>
           </p:txBody>
@@ -7852,7 +7852,7 @@
                   </a:solidFill>
                   <a:latin typeface="Calibri"/>
                 </a:rPr>
-                <a:t>Workshop (2 hr)</a:t>
+                <a:t>Workshop (4 hr)</a:t>
               </a:r>
             </a:p>
           </p:txBody>
@@ -7904,7 +7904,7 @@
                   </a:solidFill>
                   <a:latin typeface="Calibri"/>
                 </a:rPr>
-                <a:t>Seminar (1 hr)</a:t>
+                <a:t>Seminar (2 hr)</a:t>
               </a:r>
             </a:p>
           </p:txBody>
@@ -8029,7 +8029,7 @@
                   </a:solidFill>
                   <a:latin typeface="Calibri"/>
                 </a:rPr>
-                <a:t>Workshop (2 hr)</a:t>
+                <a:t>Workshop (4 hr)</a:t>
               </a:r>
             </a:p>
           </p:txBody>
@@ -8081,118 +8081,12 @@
                   </a:solidFill>
                   <a:latin typeface="Calibri"/>
                 </a:rPr>
-                <a:t>Seminar (1 hr)</a:t>
+                <a:t>Seminar (2 hr)</a:t>
               </a:r>
             </a:p>
           </p:txBody>
         </p:sp>
       </p:grpSp>
-      <p:sp>
-        <p:nvSpPr>
-          <p:cNvPr id="28" name="Rectangle: Rounded Corners 27">
-            <a:extLst>
-              <a:ext uri="{FF2B5EF4-FFF2-40B4-BE49-F238E27FC236}">
-                <a16:creationId xmlns:a16="http://schemas.microsoft.com/office/drawing/2014/main" id="{E1D9B173-5C27-FD02-C502-86F25A77F3C9}"/>
-              </a:ext>
-            </a:extLst>
-          </p:cNvPr>
-          <p:cNvSpPr/>
-          <p:nvPr/>
-        </p:nvSpPr>
-        <p:spPr>
-          <a:xfrm>
-            <a:off x="3352800" y="4314825"/>
-            <a:ext cx="1371600" cy="196850"/>
-          </a:xfrm>
-          <a:prstGeom prst="roundRect">
-            <a:avLst/>
-          </a:prstGeom>
-        </p:spPr>
-        <p:style>
-          <a:lnRef idx="2">
-            <a:schemeClr val="accent6">
-              <a:shade val="15000"/>
-            </a:schemeClr>
-          </a:lnRef>
-          <a:fillRef idx="1">
-            <a:schemeClr val="accent6"/>
-          </a:fillRef>
-          <a:effectRef idx="0">
-            <a:schemeClr val="accent6"/>
-          </a:effectRef>
-          <a:fontRef idx="minor">
-            <a:schemeClr val="lt1"/>
-          </a:fontRef>
-        </p:style>
-        <p:txBody>
-          <a:bodyPr rtlCol="0" anchor="ctr"/>
-          <a:lstStyle/>
-          <a:p>
-            <a:pPr algn="ctr" defTabSz="457200"/>
-            <a:r>
-              <a:rPr lang="en-GB" sz="1200" dirty="0">
-                <a:solidFill>
-                  <a:prstClr val="black"/>
-                </a:solidFill>
-                <a:latin typeface="Calibri"/>
-              </a:rPr>
-              <a:t>Peer review (1 hr)</a:t>
-            </a:r>
-          </a:p>
-        </p:txBody>
-      </p:sp>
-      <p:sp>
-        <p:nvSpPr>
-          <p:cNvPr id="31" name="Rectangle: Rounded Corners 30">
-            <a:extLst>
-              <a:ext uri="{FF2B5EF4-FFF2-40B4-BE49-F238E27FC236}">
-                <a16:creationId xmlns:a16="http://schemas.microsoft.com/office/drawing/2014/main" id="{F8FECBA4-A877-CE5E-A6CC-6D1C350D9D4B}"/>
-              </a:ext>
-            </a:extLst>
-          </p:cNvPr>
-          <p:cNvSpPr/>
-          <p:nvPr/>
-        </p:nvSpPr>
-        <p:spPr>
-          <a:xfrm>
-            <a:off x="3352800" y="4101465"/>
-            <a:ext cx="1371600" cy="196850"/>
-          </a:xfrm>
-          <a:prstGeom prst="roundRect">
-            <a:avLst/>
-          </a:prstGeom>
-        </p:spPr>
-        <p:style>
-          <a:lnRef idx="1">
-            <a:schemeClr val="dk1"/>
-          </a:lnRef>
-          <a:fillRef idx="2">
-            <a:schemeClr val="dk1"/>
-          </a:fillRef>
-          <a:effectRef idx="1">
-            <a:schemeClr val="dk1"/>
-          </a:effectRef>
-          <a:fontRef idx="minor">
-            <a:schemeClr val="dk1"/>
-          </a:fontRef>
-        </p:style>
-        <p:txBody>
-          <a:bodyPr rtlCol="0" anchor="ctr"/>
-          <a:lstStyle/>
-          <a:p>
-            <a:pPr algn="ctr" defTabSz="457200"/>
-            <a:r>
-              <a:rPr lang="en-GB" sz="1200" dirty="0">
-                <a:solidFill>
-                  <a:prstClr val="black"/>
-                </a:solidFill>
-                <a:latin typeface="Calibri"/>
-              </a:rPr>
-              <a:t>Drop-in (1 hr)</a:t>
-            </a:r>
-          </a:p>
-        </p:txBody>
-      </p:sp>
       <p:sp>
         <p:nvSpPr>
           <p:cNvPr id="32" name="Rectangle: Rounded Corners 31">
@@ -8400,6 +8294,237 @@
           </a:prstGeom>
         </p:spPr>
       </p:pic>
+      <p:grpSp>
+        <p:nvGrpSpPr>
+          <p:cNvPr id="29" name="Group 28">
+            <a:extLst>
+              <a:ext uri="{FF2B5EF4-FFF2-40B4-BE49-F238E27FC236}">
+                <a16:creationId xmlns:a16="http://schemas.microsoft.com/office/drawing/2014/main" id="{766882B3-854C-15AD-18AE-D2C0E2ABFB18}"/>
+              </a:ext>
+            </a:extLst>
+          </p:cNvPr>
+          <p:cNvGrpSpPr/>
+          <p:nvPr/>
+        </p:nvGrpSpPr>
+        <p:grpSpPr>
+          <a:xfrm>
+            <a:off x="3352800" y="4098925"/>
+            <a:ext cx="1371600" cy="802449"/>
+            <a:chOff x="3352800" y="4098925"/>
+            <a:chExt cx="1371600" cy="802449"/>
+          </a:xfrm>
+        </p:grpSpPr>
+        <p:sp>
+          <p:nvSpPr>
+            <p:cNvPr id="28" name="Rectangle: Rounded Corners 27">
+              <a:extLst>
+                <a:ext uri="{FF2B5EF4-FFF2-40B4-BE49-F238E27FC236}">
+                  <a16:creationId xmlns:a16="http://schemas.microsoft.com/office/drawing/2014/main" id="{E1D9B173-5C27-FD02-C502-86F25A77F3C9}"/>
+                </a:ext>
+              </a:extLst>
+            </p:cNvPr>
+            <p:cNvSpPr/>
+            <p:nvPr/>
+          </p:nvSpPr>
+          <p:spPr>
+            <a:xfrm>
+              <a:off x="3352800" y="4704524"/>
+              <a:ext cx="1371600" cy="196850"/>
+            </a:xfrm>
+            <a:prstGeom prst="roundRect">
+              <a:avLst/>
+            </a:prstGeom>
+          </p:spPr>
+          <p:style>
+            <a:lnRef idx="2">
+              <a:schemeClr val="accent6">
+                <a:shade val="15000"/>
+              </a:schemeClr>
+            </a:lnRef>
+            <a:fillRef idx="1">
+              <a:schemeClr val="accent6"/>
+            </a:fillRef>
+            <a:effectRef idx="0">
+              <a:schemeClr val="accent6"/>
+            </a:effectRef>
+            <a:fontRef idx="minor">
+              <a:schemeClr val="lt1"/>
+            </a:fontRef>
+          </p:style>
+          <p:txBody>
+            <a:bodyPr rtlCol="0" anchor="ctr"/>
+            <a:lstStyle/>
+            <a:p>
+              <a:pPr algn="ctr" defTabSz="457200"/>
+              <a:r>
+                <a:rPr lang="en-GB" sz="1200" dirty="0">
+                  <a:solidFill>
+                    <a:prstClr val="black"/>
+                  </a:solidFill>
+                  <a:latin typeface="Calibri"/>
+                </a:rPr>
+                <a:t>Peer review (2 hr)</a:t>
+              </a:r>
+            </a:p>
+          </p:txBody>
+        </p:sp>
+        <p:sp>
+          <p:nvSpPr>
+            <p:cNvPr id="31" name="Rectangle: Rounded Corners 30">
+              <a:extLst>
+                <a:ext uri="{FF2B5EF4-FFF2-40B4-BE49-F238E27FC236}">
+                  <a16:creationId xmlns:a16="http://schemas.microsoft.com/office/drawing/2014/main" id="{F8FECBA4-A877-CE5E-A6CC-6D1C350D9D4B}"/>
+                </a:ext>
+              </a:extLst>
+            </p:cNvPr>
+            <p:cNvSpPr/>
+            <p:nvPr/>
+          </p:nvSpPr>
+          <p:spPr>
+            <a:xfrm>
+              <a:off x="3352800" y="4505325"/>
+              <a:ext cx="1371600" cy="196850"/>
+            </a:xfrm>
+            <a:prstGeom prst="roundRect">
+              <a:avLst/>
+            </a:prstGeom>
+          </p:spPr>
+          <p:style>
+            <a:lnRef idx="1">
+              <a:schemeClr val="dk1"/>
+            </a:lnRef>
+            <a:fillRef idx="2">
+              <a:schemeClr val="dk1"/>
+            </a:fillRef>
+            <a:effectRef idx="1">
+              <a:schemeClr val="dk1"/>
+            </a:effectRef>
+            <a:fontRef idx="minor">
+              <a:schemeClr val="dk1"/>
+            </a:fontRef>
+          </p:style>
+          <p:txBody>
+            <a:bodyPr rtlCol="0" anchor="ctr"/>
+            <a:lstStyle/>
+            <a:p>
+              <a:pPr algn="ctr" defTabSz="457200"/>
+              <a:r>
+                <a:rPr lang="en-GB" sz="1200" dirty="0">
+                  <a:solidFill>
+                    <a:prstClr val="black"/>
+                  </a:solidFill>
+                  <a:latin typeface="Calibri"/>
+                </a:rPr>
+                <a:t>Drop-in (1 hr)</a:t>
+              </a:r>
+            </a:p>
+          </p:txBody>
+        </p:sp>
+        <p:sp>
+          <p:nvSpPr>
+            <p:cNvPr id="2" name="Rectangle: Rounded Corners 1">
+              <a:extLst>
+                <a:ext uri="{FF2B5EF4-FFF2-40B4-BE49-F238E27FC236}">
+                  <a16:creationId xmlns:a16="http://schemas.microsoft.com/office/drawing/2014/main" id="{1256918A-6321-B382-CEA5-E52CDD7B77C6}"/>
+                </a:ext>
+              </a:extLst>
+            </p:cNvPr>
+            <p:cNvSpPr/>
+            <p:nvPr/>
+          </p:nvSpPr>
+          <p:spPr>
+            <a:xfrm>
+              <a:off x="3352800" y="4098925"/>
+              <a:ext cx="1371600" cy="196850"/>
+            </a:xfrm>
+            <a:prstGeom prst="roundRect">
+              <a:avLst/>
+            </a:prstGeom>
+          </p:spPr>
+          <p:style>
+            <a:lnRef idx="1">
+              <a:schemeClr val="accent3"/>
+            </a:lnRef>
+            <a:fillRef idx="2">
+              <a:schemeClr val="accent3"/>
+            </a:fillRef>
+            <a:effectRef idx="1">
+              <a:schemeClr val="accent3"/>
+            </a:effectRef>
+            <a:fontRef idx="minor">
+              <a:schemeClr val="dk1"/>
+            </a:fontRef>
+          </p:style>
+          <p:txBody>
+            <a:bodyPr rtlCol="0" anchor="ctr"/>
+            <a:lstStyle/>
+            <a:p>
+              <a:pPr algn="ctr" defTabSz="457200"/>
+              <a:r>
+                <a:rPr lang="en-GB" sz="1200" dirty="0">
+                  <a:solidFill>
+                    <a:prstClr val="black"/>
+                  </a:solidFill>
+                  <a:latin typeface="Calibri"/>
+                </a:rPr>
+                <a:t>Lecture (1 hr)</a:t>
+              </a:r>
+            </a:p>
+          </p:txBody>
+        </p:sp>
+        <p:sp>
+          <p:nvSpPr>
+            <p:cNvPr id="27" name="Rectangle: Rounded Corners 26">
+              <a:extLst>
+                <a:ext uri="{FF2B5EF4-FFF2-40B4-BE49-F238E27FC236}">
+                  <a16:creationId xmlns:a16="http://schemas.microsoft.com/office/drawing/2014/main" id="{013CE554-F478-F408-6396-B1770A690A5C}"/>
+                </a:ext>
+              </a:extLst>
+            </p:cNvPr>
+            <p:cNvSpPr/>
+            <p:nvPr/>
+          </p:nvSpPr>
+          <p:spPr>
+            <a:xfrm>
+              <a:off x="3352800" y="4298950"/>
+              <a:ext cx="1371600" cy="196850"/>
+            </a:xfrm>
+            <a:prstGeom prst="roundRect">
+              <a:avLst/>
+            </a:prstGeom>
+          </p:spPr>
+          <p:style>
+            <a:lnRef idx="1">
+              <a:schemeClr val="accent5"/>
+            </a:lnRef>
+            <a:fillRef idx="2">
+              <a:schemeClr val="accent5"/>
+            </a:fillRef>
+            <a:effectRef idx="1">
+              <a:schemeClr val="accent5"/>
+            </a:effectRef>
+            <a:fontRef idx="minor">
+              <a:schemeClr val="dk1"/>
+            </a:fontRef>
+          </p:style>
+          <p:txBody>
+            <a:bodyPr rtlCol="0" anchor="ctr"/>
+            <a:lstStyle/>
+            <a:p>
+              <a:pPr algn="ctr" defTabSz="457200"/>
+              <a:r>
+                <a:rPr lang="en-GB" sz="1200" dirty="0">
+                  <a:solidFill>
+                    <a:prstClr val="black"/>
+                  </a:solidFill>
+                  <a:latin typeface="Calibri"/>
+                </a:rPr>
+                <a:t>Workshop (4 hr)</a:t>
+              </a:r>
+            </a:p>
+          </p:txBody>
+        </p:sp>
+      </p:grpSp>
     </p:spTree>
     <p:extLst>
       <p:ext uri="{BB962C8B-B14F-4D97-AF65-F5344CB8AC3E}">

</xml_diff>